<commit_message>
Apply corrections to slides supplied by Mum
</commit_message>
<xml_diff>
--- a/slides/156 - Stand up and bless the Lord.pptx
+++ b/slides/156 - Stand up and bless the Lord.pptx
@@ -141,6 +141,14 @@
       </a:defRPr>
     </a:lvl9pPr>
   </p:defaultTextStyle>
+  <p:extLst>
+    <p:ext uri="{EFAFB233-063F-42B5-8137-9DF3F51BA10A}">
+      <p15:sldGuideLst xmlns:p15="http://schemas.microsoft.com/office/powerpoint/2012/main"/>
+    </p:ext>
+    <p:ext uri="{2D200454-40CA-4A62-9FC3-DE9A4176ACB9}">
+      <p15:notesGuideLst xmlns:p15="http://schemas.microsoft.com/office/powerpoint/2012/main"/>
+    </p:ext>
+  </p:extLst>
 </p:presentation>
 </file>
 
@@ -239,7 +247,7 @@
               <a:pPr>
                 <a:defRPr/>
               </a:pPr>
-              <a:t>26/02/2014</a:t>
+              <a:t>2/07/2020</a:t>
             </a:fld>
             <a:endParaRPr lang="en-NZ"/>
           </a:p>
@@ -3811,7 +3819,19 @@
           <a:p>
             <a:r>
               <a:rPr lang="en-GB" dirty="0"/>
-              <a:t>	stand up and praise the Lord your God</a:t>
+              <a:t>	stand up </a:t>
+            </a:r>
+            <a:r>
+              <a:rPr lang="en-GB"/>
+              <a:t>and </a:t>
+            </a:r>
+            <a:r>
+              <a:rPr lang="en-GB" smtClean="0"/>
+              <a:t>bless </a:t>
+            </a:r>
+            <a:r>
+              <a:rPr lang="en-GB" dirty="0"/>
+              <a:t>the Lord your God</a:t>
             </a:r>
             <a:endParaRPr lang="en-NZ" dirty="0"/>
           </a:p>

</xml_diff>